<commit_message>
added a predentation pdf file
</commit_message>
<xml_diff>
--- a/Seattle Terry Stop Project Presentation.pptx
+++ b/Seattle Terry Stop Project Presentation.pptx
@@ -110,6 +110,11 @@
       </a:defRPr>
     </a:lvl9pPr>
   </p:defaultTextStyle>
+  <p:extLst>
+    <p:ext uri="{EFAFB233-063F-42B5-8137-9DF3F51BA10A}">
+      <p15:sldGuideLst xmlns:p15="http://schemas.microsoft.com/office/powerpoint/2012/main"/>
+    </p:ext>
+  </p:extLst>
 </p:presentation>
 </file>
 
@@ -614,7 +619,7 @@
           <a:p>
             <a:fld id="{B79B26A4-24A1-8945-89F8-C9616E994AE0}" type="datetimeFigureOut">
               <a:rPr lang="en-US" smtClean="0"/>
-              <a:t>9/1/24</a:t>
+              <a:t>9/2/24</a:t>
             </a:fld>
             <a:endParaRPr lang="en-US"/>
           </a:p>
@@ -791,7 +796,7 @@
           <a:p>
             <a:fld id="{B79B26A4-24A1-8945-89F8-C9616E994AE0}" type="datetimeFigureOut">
               <a:rPr lang="en-US" smtClean="0"/>
-              <a:t>9/1/24</a:t>
+              <a:t>9/2/24</a:t>
             </a:fld>
             <a:endParaRPr lang="en-US"/>
           </a:p>
@@ -971,7 +976,7 @@
           <a:p>
             <a:fld id="{B79B26A4-24A1-8945-89F8-C9616E994AE0}" type="datetimeFigureOut">
               <a:rPr lang="en-US" smtClean="0"/>
-              <a:t>9/1/24</a:t>
+              <a:t>9/2/24</a:t>
             </a:fld>
             <a:endParaRPr lang="en-US"/>
           </a:p>
@@ -1141,7 +1146,7 @@
           <a:p>
             <a:fld id="{B79B26A4-24A1-8945-89F8-C9616E994AE0}" type="datetimeFigureOut">
               <a:rPr lang="en-US" smtClean="0"/>
-              <a:t>9/1/24</a:t>
+              <a:t>9/2/24</a:t>
             </a:fld>
             <a:endParaRPr lang="en-US"/>
           </a:p>
@@ -1462,7 +1467,7 @@
           <a:p>
             <a:fld id="{B79B26A4-24A1-8945-89F8-C9616E994AE0}" type="datetimeFigureOut">
               <a:rPr lang="en-US" smtClean="0"/>
-              <a:t>9/1/24</a:t>
+              <a:t>9/2/24</a:t>
             </a:fld>
             <a:endParaRPr lang="en-US"/>
           </a:p>
@@ -1922,7 +1927,7 @@
           <a:p>
             <a:fld id="{B79B26A4-24A1-8945-89F8-C9616E994AE0}" type="datetimeFigureOut">
               <a:rPr lang="en-US" smtClean="0"/>
-              <a:t>9/1/24</a:t>
+              <a:t>9/2/24</a:t>
             </a:fld>
             <a:endParaRPr lang="en-US"/>
           </a:p>
@@ -2333,7 +2338,7 @@
           <a:p>
             <a:fld id="{B79B26A4-24A1-8945-89F8-C9616E994AE0}" type="datetimeFigureOut">
               <a:rPr lang="en-US" smtClean="0"/>
-              <a:t>9/1/24</a:t>
+              <a:t>9/2/24</a:t>
             </a:fld>
             <a:endParaRPr lang="en-US"/>
           </a:p>
@@ -2451,7 +2456,7 @@
           <a:p>
             <a:fld id="{B79B26A4-24A1-8945-89F8-C9616E994AE0}" type="datetimeFigureOut">
               <a:rPr lang="en-US" smtClean="0"/>
-              <a:t>9/1/24</a:t>
+              <a:t>9/2/24</a:t>
             </a:fld>
             <a:endParaRPr lang="en-US"/>
           </a:p>
@@ -2568,7 +2573,7 @@
           <a:p>
             <a:fld id="{B79B26A4-24A1-8945-89F8-C9616E994AE0}" type="datetimeFigureOut">
               <a:rPr lang="en-US" smtClean="0"/>
-              <a:t>9/1/24</a:t>
+              <a:t>9/2/24</a:t>
             </a:fld>
             <a:endParaRPr lang="en-US"/>
           </a:p>
@@ -2926,7 +2931,7 @@
           <a:p>
             <a:fld id="{B79B26A4-24A1-8945-89F8-C9616E994AE0}" type="datetimeFigureOut">
               <a:rPr lang="en-US" smtClean="0"/>
-              <a:t>9/1/24</a:t>
+              <a:t>9/2/24</a:t>
             </a:fld>
             <a:endParaRPr lang="en-US"/>
           </a:p>
@@ -3433,7 +3438,7 @@
           <a:p>
             <a:fld id="{B79B26A4-24A1-8945-89F8-C9616E994AE0}" type="datetimeFigureOut">
               <a:rPr lang="en-US" smtClean="0"/>
-              <a:t>9/1/24</a:t>
+              <a:t>9/2/24</a:t>
             </a:fld>
             <a:endParaRPr lang="en-US"/>
           </a:p>
@@ -3788,7 +3793,7 @@
           <a:p>
             <a:fld id="{B79B26A4-24A1-8945-89F8-C9616E994AE0}" type="datetimeFigureOut">
               <a:rPr lang="en-US" smtClean="0"/>
-              <a:t>9/1/24</a:t>
+              <a:t>9/2/24</a:t>
             </a:fld>
             <a:endParaRPr lang="en-US"/>
           </a:p>
@@ -4497,12 +4502,12 @@
         <p:spPr>
           <a:xfrm>
             <a:off x="922946" y="4468030"/>
-            <a:ext cx="8038174" cy="685083"/>
+            <a:ext cx="8038174" cy="957747"/>
           </a:xfrm>
         </p:spPr>
         <p:txBody>
           <a:bodyPr>
-            <a:normAutofit fontScale="92500" lnSpcReduction="20000"/>
+            <a:normAutofit fontScale="77500" lnSpcReduction="20000"/>
           </a:bodyPr>
           <a:lstStyle/>
           <a:p>
@@ -4516,6 +4521,29 @@
               <a:rPr lang="en-US" dirty="0"/>
               <a:t>Shamla Araya</a:t>
             </a:r>
+          </a:p>
+          <a:p>
+            <a:r>
+              <a:rPr lang="en-US" b="0" i="0" u="none" strike="noStrike" dirty="0">
+                <a:solidFill>
+                  <a:srgbClr val="2D3B45"/>
+                </a:solidFill>
+                <a:effectLst/>
+                <a:latin typeface="Lato Extended"/>
+                <a:hlinkClick r:id="rId2"/>
+              </a:rPr>
+              <a:t>DSF-PT07P3</a:t>
+            </a:r>
+            <a:endParaRPr lang="en-US" b="0" i="0" dirty="0">
+              <a:solidFill>
+                <a:srgbClr val="2D3B45"/>
+              </a:solidFill>
+              <a:effectLst/>
+              <a:latin typeface="Lato Extended"/>
+            </a:endParaRPr>
+          </a:p>
+          <a:p>
+            <a:endParaRPr lang="en-US" dirty="0"/>
           </a:p>
           <a:p>
             <a:endParaRPr lang="en-US" dirty="0"/>
@@ -4537,7 +4565,7 @@
           <p:nvPr/>
         </p:nvPicPr>
         <p:blipFill>
-          <a:blip r:embed="rId2">
+          <a:blip r:embed="rId3">
             <a:extLst>
               <a:ext uri="{28A0092B-C50C-407E-A947-70E740481C1C}">
                 <a14:useLocalDpi xmlns:a14="http://schemas.microsoft.com/office/drawing/2010/main" val="0"/>

</xml_diff>